<commit_message>
confidental mark removed from presentation
</commit_message>
<xml_diff>
--- a/SWIFT TLC - Overview.pptx
+++ b/SWIFT TLC - Overview.pptx
@@ -22661,63 +22661,6 @@
       </p:sp>
       <p:sp>
         <p:nvSpPr>
-          <p:cNvPr id="2" name="Titel 1"/>
-          <p:cNvSpPr>
-            <a:spLocks noGrp="1"/>
-          </p:cNvSpPr>
-          <p:nvPr>
-            <p:ph type="title" hasCustomPrompt="1"/>
-          </p:nvPr>
-        </p:nvSpPr>
-        <p:spPr>
-          <a:xfrm>
-            <a:off x="251520" y="2281808"/>
-            <a:ext cx="6912768" cy="461020"/>
-          </a:xfrm>
-          <a:prstGeom prst="rect">
-            <a:avLst/>
-          </a:prstGeom>
-        </p:spPr>
-        <p:txBody>
-          <a:bodyPr/>
-          <a:lstStyle>
-            <a:lvl1pPr algn="l">
-              <a:defRPr sz="3000" b="1" baseline="0">
-                <a:solidFill>
-                  <a:srgbClr val="DA002E"/>
-                </a:solidFill>
-                <a:latin typeface="Arial" pitchFamily="34" charset="0"/>
-                <a:cs typeface="Arial" pitchFamily="34" charset="0"/>
-              </a:defRPr>
-            </a:lvl1pPr>
-          </a:lstStyle>
-          <a:p>
-            <a:r>
-              <a:rPr lang="de-DE" dirty="0" smtClean="0"/>
-              <a:t>Click </a:t>
-            </a:r>
-            <a:r>
-              <a:rPr lang="de-DE" dirty="0" err="1" smtClean="0"/>
-              <a:t>to</a:t>
-            </a:r>
-            <a:r>
-              <a:rPr lang="de-DE" dirty="0" smtClean="0"/>
-              <a:t> </a:t>
-            </a:r>
-            <a:r>
-              <a:rPr lang="de-DE" dirty="0" err="1" smtClean="0"/>
-              <a:t>change</a:t>
-            </a:r>
-            <a:r>
-              <a:rPr lang="de-DE" dirty="0" smtClean="0"/>
-              <a:t> title</a:t>
-            </a:r>
-            <a:endParaRPr lang="de-DE" dirty="0"/>
-          </a:p>
-        </p:txBody>
-      </p:sp>
-      <p:sp>
-        <p:nvSpPr>
           <p:cNvPr id="12" name="Textplatzhalter 11"/>
           <p:cNvSpPr>
             <a:spLocks noGrp="1"/>
@@ -29909,142 +29852,6 @@
               <a:rPr lang="en-US" noProof="0" dirty="0" smtClean="0"/>
               <a:t>Best in Development and Technology</a:t>
             </a:r>
-          </a:p>
-        </p:txBody>
-      </p:sp>
-      <p:sp>
-        <p:nvSpPr>
-          <p:cNvPr id="13" name="Datumsplatzhalter 3"/>
-          <p:cNvSpPr txBox="1">
-            <a:spLocks/>
-          </p:cNvSpPr>
-          <p:nvPr userDrawn="1"/>
-        </p:nvSpPr>
-        <p:spPr>
-          <a:xfrm>
-            <a:off x="3409239" y="6453336"/>
-            <a:ext cx="2160240" cy="365125"/>
-          </a:xfrm>
-          <a:prstGeom prst="rect">
-            <a:avLst/>
-          </a:prstGeom>
-        </p:spPr>
-        <p:txBody>
-          <a:bodyPr/>
-          <a:lstStyle>
-            <a:defPPr>
-              <a:defRPr lang="de-DE"/>
-            </a:defPPr>
-            <a:lvl1pPr marL="0" algn="l" defTabSz="914400" rtl="0" eaLnBrk="1" latinLnBrk="0" hangingPunct="1">
-              <a:defRPr sz="1800" b="1" kern="1200">
-                <a:solidFill>
-                  <a:schemeClr val="bg1"/>
-                </a:solidFill>
-                <a:latin typeface="Arial" pitchFamily="34" charset="0"/>
-                <a:ea typeface="+mn-ea"/>
-                <a:cs typeface="Arial" pitchFamily="34" charset="0"/>
-              </a:defRPr>
-            </a:lvl1pPr>
-            <a:lvl2pPr marL="457200" algn="l" defTabSz="914400" rtl="0" eaLnBrk="1" latinLnBrk="0" hangingPunct="1">
-              <a:defRPr sz="1800" kern="1200">
-                <a:solidFill>
-                  <a:schemeClr val="tx1"/>
-                </a:solidFill>
-                <a:latin typeface="+mn-lt"/>
-                <a:ea typeface="+mn-ea"/>
-                <a:cs typeface="+mn-cs"/>
-              </a:defRPr>
-            </a:lvl2pPr>
-            <a:lvl3pPr marL="914400" algn="l" defTabSz="914400" rtl="0" eaLnBrk="1" latinLnBrk="0" hangingPunct="1">
-              <a:defRPr sz="1800" kern="1200">
-                <a:solidFill>
-                  <a:schemeClr val="tx1"/>
-                </a:solidFill>
-                <a:latin typeface="+mn-lt"/>
-                <a:ea typeface="+mn-ea"/>
-                <a:cs typeface="+mn-cs"/>
-              </a:defRPr>
-            </a:lvl3pPr>
-            <a:lvl4pPr marL="1371600" algn="l" defTabSz="914400" rtl="0" eaLnBrk="1" latinLnBrk="0" hangingPunct="1">
-              <a:defRPr sz="1800" kern="1200">
-                <a:solidFill>
-                  <a:schemeClr val="tx1"/>
-                </a:solidFill>
-                <a:latin typeface="+mn-lt"/>
-                <a:ea typeface="+mn-ea"/>
-                <a:cs typeface="+mn-cs"/>
-              </a:defRPr>
-            </a:lvl4pPr>
-            <a:lvl5pPr marL="1828800" algn="l" defTabSz="914400" rtl="0" eaLnBrk="1" latinLnBrk="0" hangingPunct="1">
-              <a:defRPr sz="1800" kern="1200">
-                <a:solidFill>
-                  <a:schemeClr val="tx1"/>
-                </a:solidFill>
-                <a:latin typeface="+mn-lt"/>
-                <a:ea typeface="+mn-ea"/>
-                <a:cs typeface="+mn-cs"/>
-              </a:defRPr>
-            </a:lvl5pPr>
-            <a:lvl6pPr marL="2286000" algn="l" defTabSz="914400" rtl="0" eaLnBrk="1" latinLnBrk="0" hangingPunct="1">
-              <a:defRPr sz="1800" kern="1200">
-                <a:solidFill>
-                  <a:schemeClr val="tx1"/>
-                </a:solidFill>
-                <a:latin typeface="+mn-lt"/>
-                <a:ea typeface="+mn-ea"/>
-                <a:cs typeface="+mn-cs"/>
-              </a:defRPr>
-            </a:lvl6pPr>
-            <a:lvl7pPr marL="2743200" algn="l" defTabSz="914400" rtl="0" eaLnBrk="1" latinLnBrk="0" hangingPunct="1">
-              <a:defRPr sz="1800" kern="1200">
-                <a:solidFill>
-                  <a:schemeClr val="tx1"/>
-                </a:solidFill>
-                <a:latin typeface="+mn-lt"/>
-                <a:ea typeface="+mn-ea"/>
-                <a:cs typeface="+mn-cs"/>
-              </a:defRPr>
-            </a:lvl7pPr>
-            <a:lvl8pPr marL="3200400" algn="l" defTabSz="914400" rtl="0" eaLnBrk="1" latinLnBrk="0" hangingPunct="1">
-              <a:defRPr sz="1800" kern="1200">
-                <a:solidFill>
-                  <a:schemeClr val="tx1"/>
-                </a:solidFill>
-                <a:latin typeface="+mn-lt"/>
-                <a:ea typeface="+mn-ea"/>
-                <a:cs typeface="+mn-cs"/>
-              </a:defRPr>
-            </a:lvl8pPr>
-            <a:lvl9pPr marL="3657600" algn="l" defTabSz="914400" rtl="0" eaLnBrk="1" latinLnBrk="0" hangingPunct="1">
-              <a:defRPr sz="1800" kern="1200">
-                <a:solidFill>
-                  <a:schemeClr val="tx1"/>
-                </a:solidFill>
-                <a:latin typeface="+mn-lt"/>
-                <a:ea typeface="+mn-ea"/>
-                <a:cs typeface="+mn-cs"/>
-              </a:defRPr>
-            </a:lvl9pPr>
-          </a:lstStyle>
-          <a:p>
-            <a:pPr algn="ctr" fontAlgn="auto">
-              <a:spcBef>
-                <a:spcPts val="0"/>
-              </a:spcBef>
-              <a:spcAft>
-                <a:spcPts val="0"/>
-              </a:spcAft>
-              <a:defRPr/>
-            </a:pPr>
-            <a:r>
-              <a:rPr lang="en-US" sz="1200" noProof="0" dirty="0" smtClean="0"/>
-              <a:t>- Company</a:t>
-            </a:r>
-            <a:r>
-              <a:rPr lang="en-US" sz="1200" baseline="0" noProof="0" dirty="0" smtClean="0"/>
-              <a:t> Confidential - </a:t>
-            </a:r>
-            <a:endParaRPr lang="en-US" sz="1200" noProof="0" dirty="0" smtClean="0"/>
           </a:p>
         </p:txBody>
       </p:sp>
@@ -33104,13 +32911,8 @@
             </a:pPr>
             <a:r>
               <a:rPr lang="en-US" sz="1200" dirty="0" smtClean="0"/>
-              <a:t>Default OpenStack SWIFT environment (ideally based on </a:t>
-            </a:r>
-            <a:r>
-              <a:rPr lang="en-US" sz="1200" dirty="0" smtClean="0"/>
-              <a:t>CentOS 7)</a:t>
-            </a:r>
-            <a:endParaRPr lang="en-US" sz="1200" dirty="0" smtClean="0"/>
+              <a:t>Default OpenStack SWIFT environment (ideally based on CentOS 7)</a:t>
+            </a:r>
           </a:p>
           <a:p>
             <a:pPr lvl="1">
@@ -33154,13 +32956,8 @@
             </a:pPr>
             <a:r>
               <a:rPr lang="en-US" sz="1200" dirty="0" smtClean="0"/>
-              <a:t>Default SWIFT Storage  Node + BDT SWIFT Tape Library Connector (TLC) with attached Tape Library (MultiStak or FlexStor) (needs to be a physical server), OS: </a:t>
-            </a:r>
-            <a:r>
-              <a:rPr lang="en-US" sz="1200" dirty="0" smtClean="0"/>
-              <a:t>CentOS7</a:t>
-            </a:r>
-            <a:endParaRPr lang="en-US" sz="1200" dirty="0" smtClean="0"/>
+              <a:t>Default SWIFT Storage  Node + BDT SWIFT Tape Library Connector (TLC) with attached Tape Library (MultiStak or FlexStor) (needs to be a physical server), OS: CentOS7</a:t>
+            </a:r>
           </a:p>
           <a:p>
             <a:pPr marL="180975" lvl="1" indent="0">
@@ -33542,39 +33339,7 @@
                   <a:srgbClr val="C00000"/>
                 </a:solidFill>
               </a:rPr>
-              <a:t>SWIFT TLC </a:t>
-            </a:r>
-            <a:r>
-              <a:rPr lang="en-US" dirty="0" smtClean="0">
-                <a:solidFill>
-                  <a:srgbClr val="C00000"/>
-                </a:solidFill>
-              </a:rPr>
-              <a:t>enables </a:t>
-            </a:r>
-            <a:r>
-              <a:rPr lang="en-US" dirty="0" smtClean="0">
-                <a:solidFill>
-                  <a:srgbClr val="C00000"/>
-                </a:solidFill>
-              </a:rPr>
-              <a:t>simple, </a:t>
-            </a:r>
-            <a:r>
-              <a:rPr lang="en-US" dirty="0" smtClean="0">
-                <a:solidFill>
-                  <a:srgbClr val="C00000"/>
-                </a:solidFill>
-              </a:rPr>
-              <a:t>seamless, transparent </a:t>
-            </a:r>
-            <a:r>
-              <a:rPr lang="en-US" dirty="0" smtClean="0">
-                <a:solidFill>
-                  <a:srgbClr val="C00000"/>
-                </a:solidFill>
-              </a:rPr>
-              <a:t>tape library integration into an OpenStack SWIFT environment</a:t>
+              <a:t>SWIFT TLC enables simple, seamless, transparent tape library integration into an OpenStack SWIFT environment</a:t>
             </a:r>
           </a:p>
           <a:p>
@@ -33954,7 +33719,6 @@
               <a:rPr lang="en-US" sz="1700" dirty="0"/>
               <a:t>Uses LTFS to store objects on tape</a:t>
             </a:r>
-            <a:endParaRPr lang="en-US" sz="1700" dirty="0"/>
           </a:p>
         </p:txBody>
       </p:sp>
@@ -35118,19 +34882,7 @@
                           <a:ea typeface="+mn-ea"/>
                           <a:cs typeface="+mn-cs"/>
                         </a:rPr>
-                        <a:t>increase time out for proxy </a:t>
-                      </a:r>
-                      <a:r>
-                        <a:rPr lang="en-US" sz="1300" b="1" kern="1200" dirty="0" smtClean="0">
-                          <a:solidFill>
-                            <a:schemeClr val="lt1"/>
-                          </a:solidFill>
-                          <a:effectLst/>
-                          <a:latin typeface="+mn-lt"/>
-                          <a:ea typeface="+mn-ea"/>
-                          <a:cs typeface="+mn-cs"/>
-                        </a:rPr>
-                        <a:t>server</a:t>
+                        <a:t>increase time out for proxy server</a:t>
                       </a:r>
                     </a:p>
                     <a:p>
@@ -35821,25 +35573,13 @@
                         <a:rPr lang="en-US" sz="1300" baseline="0" dirty="0" smtClean="0">
                           <a:effectLst/>
                         </a:rPr>
-                        <a:t> this </a:t>
-                      </a:r>
-                      <a:r>
-                        <a:rPr lang="en-US" sz="1300" baseline="0" dirty="0" smtClean="0">
-                          <a:effectLst/>
-                        </a:rPr>
-                        <a:t>SWIFT auditor source file </a:t>
+                        <a:t> this SWIFT auditor source file </a:t>
                       </a:r>
                       <a:r>
                         <a:rPr lang="en-US" sz="1300" dirty="0" smtClean="0">
                           <a:effectLst/>
                         </a:rPr>
-                        <a:t>to </a:t>
-                      </a:r>
-                      <a:r>
-                        <a:rPr lang="en-US" sz="1300" dirty="0" smtClean="0">
-                          <a:effectLst/>
-                        </a:rPr>
-                        <a:t>use TLC Tape Auditor for TLC nodes.</a:t>
+                        <a:t>to use TLC Tape Auditor for TLC nodes.</a:t>
                       </a:r>
                       <a:r>
                         <a:rPr lang="en-US" sz="1300" baseline="0" dirty="0" smtClean="0">
@@ -37280,15 +37020,7 @@
             </a:pPr>
             <a:r>
               <a:rPr lang="en-US" sz="1200" dirty="0" smtClean="0"/>
-              <a:t>Setup default OpenStack SWIFT environment with 1 Proxy Server and 3 Storage Nodes, configure SWIFT and verify functionality, use </a:t>
-            </a:r>
-            <a:r>
-              <a:rPr lang="en-US" sz="1200" dirty="0" smtClean="0"/>
-              <a:t>CentOS 7 as </a:t>
-            </a:r>
-            <a:r>
-              <a:rPr lang="en-US" sz="1200" dirty="0" smtClean="0"/>
-              <a:t>Server OS</a:t>
+              <a:t>Setup default OpenStack SWIFT environment with 1 Proxy Server and 3 Storage Nodes, configure SWIFT and verify functionality, use CentOS 7 as Server OS</a:t>
             </a:r>
           </a:p>
           <a:p>
@@ -37413,11 +37145,7 @@
             </a:r>
             <a:r>
               <a:rPr lang="en-US" sz="1200" dirty="0" smtClean="0"/>
-              <a:t> </a:t>
-            </a:r>
-            <a:r>
-              <a:rPr lang="en-US" sz="1200" dirty="0" smtClean="0"/>
-              <a:t>tape library from HP, IBM, DELL, Fujitsu, Overland, Spectra Logic, actidata, BDT</a:t>
+              <a:t> tape library from HP, IBM, DELL, Fujitsu, Overland, Spectra Logic, actidata, BDT</a:t>
             </a:r>
             <a:endParaRPr lang="en-US" sz="1200" dirty="0"/>
           </a:p>
@@ -37508,19 +37236,7 @@
             </a:pPr>
             <a:r>
               <a:rPr lang="en-US" sz="1200" dirty="0" smtClean="0"/>
-              <a:t>Install BDT TLC software and SWIFT </a:t>
-            </a:r>
-            <a:r>
-              <a:rPr lang="en-US" sz="1200" dirty="0" smtClean="0"/>
-              <a:t>service </a:t>
-            </a:r>
-            <a:r>
-              <a:rPr lang="en-US" sz="1200" dirty="0" smtClean="0"/>
-              <a:t>using installer  </a:t>
-            </a:r>
-            <a:r>
-              <a:rPr lang="en-US" sz="1200" dirty="0" smtClean="0"/>
-              <a:t>(refer </a:t>
+              <a:t>Install BDT TLC software and SWIFT service using installer  (refer </a:t>
             </a:r>
             <a:r>
               <a:rPr lang="en-US" sz="1200" dirty="0" err="1" smtClean="0"/>
@@ -37532,13 +37248,8 @@
             </a:r>
             <a:r>
               <a:rPr lang="en-US" sz="1200" dirty="0" smtClean="0"/>
-              <a:t>document</a:t>
-            </a:r>
-            <a:r>
-              <a:rPr lang="en-US" sz="1200" dirty="0" smtClean="0"/>
-              <a:t>)</a:t>
-            </a:r>
-            <a:endParaRPr lang="en-US" sz="1200" dirty="0" smtClean="0"/>
+              <a:t>document)</a:t>
+            </a:r>
           </a:p>
           <a:p>
             <a:pPr lvl="1">
@@ -37589,11 +37300,7 @@
             </a:pPr>
             <a:r>
               <a:rPr lang="en-US" sz="1200" dirty="0" smtClean="0"/>
-              <a:t>Add TLC VFS root </a:t>
-            </a:r>
-            <a:r>
-              <a:rPr lang="en-US" sz="1200" dirty="0" smtClean="0"/>
-              <a:t>folder (/</a:t>
+              <a:t>Add TLC VFS root folder (/</a:t>
             </a:r>
             <a:r>
               <a:rPr lang="en-US" sz="1200" dirty="0" err="1" smtClean="0"/>
@@ -37609,19 +37316,7 @@
             </a:r>
             <a:r>
               <a:rPr lang="en-US" sz="1200" dirty="0" smtClean="0"/>
-              <a:t>) </a:t>
-            </a:r>
-            <a:r>
-              <a:rPr lang="en-US" sz="1200" dirty="0" smtClean="0"/>
-              <a:t>to SWIFT </a:t>
-            </a:r>
-            <a:r>
-              <a:rPr lang="en-US" sz="1200" dirty="0" smtClean="0"/>
-              <a:t>ring </a:t>
-            </a:r>
-            <a:r>
-              <a:rPr lang="en-US" sz="1200" dirty="0" smtClean="0"/>
-              <a:t>configuration on Proxy Server and distribute modified SWIFT Ring configuration files to all Storage Nodes</a:t>
+              <a:t>) to SWIFT ring configuration on Proxy Server and distribute modified SWIFT Ring configuration files to all Storage Nodes</a:t>
             </a:r>
           </a:p>
           <a:p>
@@ -37697,11 +37392,7 @@
             <a:pPr algn="ctr"/>
             <a:r>
               <a:rPr lang="en-US" sz="1400" dirty="0" smtClean="0"/>
-              <a:t>Detailed Information available in BDT </a:t>
-            </a:r>
-            <a:r>
-              <a:rPr lang="en-US" sz="1400" dirty="0" smtClean="0"/>
-              <a:t>SWIFT_TLC _QuickStart.pdf</a:t>
+              <a:t>Detailed Information available in BDT SWIFT_TLC _QuickStart.pdf</a:t>
             </a:r>
             <a:endParaRPr lang="en-US" sz="1400" dirty="0"/>
           </a:p>
@@ -39731,30 +39422,6 @@
 </file>
 
 <file path=customXml/item1.xml><?xml version="1.0" encoding="utf-8"?>
-<?mso-contentType ?>
-<FormTemplates xmlns="http://schemas.microsoft.com/sharepoint/v3/contenttype/forms">
-  <Display>DocumentLibraryForm</Display>
-  <Edit>DocumentLibraryForm</Edit>
-  <New>DocumentLibraryForm</New>
-</FormTemplates>
-</file>
-
-<file path=customXml/item2.xml><?xml version="1.0" encoding="utf-8"?>
-<p:properties xmlns:p="http://schemas.microsoft.com/office/2006/metadata/properties" xmlns:xsi="http://www.w3.org/2001/XMLSchema-instance">
-  <documentManagement>
-    <Rev_x002e_ xmlns="860ba459-ffb5-44b5-9822-85bb2487d260">5</Rev_x002e_>
-    <Creator xmlns="860ba459-ffb5-44b5-9822-85bb2487d260">Deuter Melanie</Creator>
-    <Code xmlns="860ba459-ffb5-44b5-9822-85bb2487d260">0005</Code>
-    <Document xmlns="860ba459-ffb5-44b5-9822-85bb2487d260">Master BDT Power Point</Document>
-    <Status xmlns="860ba459-ffb5-44b5-9822-85bb2487d260">Released</Status>
-    <Dep_x002e_ xmlns="860ba459-ffb5-44b5-9822-85bb2487d260">General Management</Dep_x002e_>
-    <Common xmlns="860ba459-ffb5-44b5-9822-85bb2487d260">false</Common>
-    <Code_x0020__x0028_old_x0029_ xmlns="860ba459-ffb5-44b5-9822-85bb2487d260" xsi:nil="true"/>
-  </documentManagement>
-</p:properties>
-</file>
-
-<file path=customXml/item3.xml><?xml version="1.0" encoding="utf-8"?>
 <ct:contentTypeSchema xmlns:ct="http://schemas.microsoft.com/office/2006/metadata/contentType" xmlns:ma="http://schemas.microsoft.com/office/2006/metadata/properties/metaAttributes" ct:_="" ma:_="" ma:contentTypeName="Document" ma:contentTypeID="0x010100B64ACC541BB8E2409BD6DB8216918708" ma:contentTypeVersion="8" ma:contentTypeDescription="Create a new document." ma:contentTypeScope="" ma:versionID="2bee1d361194ed24bab2ef98d46a27b7">
   <xsd:schema xmlns:xsd="http://www.w3.org/2001/XMLSchema" xmlns:p="http://schemas.microsoft.com/office/2006/metadata/properties" xmlns:ns2="860ba459-ffb5-44b5-9822-85bb2487d260" targetNamespace="http://schemas.microsoft.com/office/2006/metadata/properties" ma:root="true" ma:fieldsID="ce0b00e55cada7d77ce16c67ffad780d" ns2:_="">
     <xsd:import namespace="860ba459-ffb5-44b5-9822-85bb2487d260"/>
@@ -39872,30 +39539,31 @@
 </ct:contentTypeSchema>
 </file>
 
-<file path=customXml/itemProps1.xml><?xml version="1.0" encoding="utf-8"?>
-<ds:datastoreItem xmlns:ds="http://schemas.openxmlformats.org/officeDocument/2006/customXml" ds:itemID="{7265E8A9-CA70-4BF7-A7BA-C90C3F4E27E7}">
-  <ds:schemaRefs>
-    <ds:schemaRef ds:uri="http://schemas.microsoft.com/sharepoint/v3/contenttype/forms"/>
-  </ds:schemaRefs>
-</ds:datastoreItem>
+<file path=customXml/item2.xml><?xml version="1.0" encoding="utf-8"?>
+<p:properties xmlns:p="http://schemas.microsoft.com/office/2006/metadata/properties" xmlns:xsi="http://www.w3.org/2001/XMLSchema-instance">
+  <documentManagement>
+    <Rev_x002e_ xmlns="860ba459-ffb5-44b5-9822-85bb2487d260">5</Rev_x002e_>
+    <Creator xmlns="860ba459-ffb5-44b5-9822-85bb2487d260">Deuter Melanie</Creator>
+    <Code xmlns="860ba459-ffb5-44b5-9822-85bb2487d260">0005</Code>
+    <Document xmlns="860ba459-ffb5-44b5-9822-85bb2487d260">Master BDT Power Point</Document>
+    <Status xmlns="860ba459-ffb5-44b5-9822-85bb2487d260">Released</Status>
+    <Dep_x002e_ xmlns="860ba459-ffb5-44b5-9822-85bb2487d260">General Management</Dep_x002e_>
+    <Common xmlns="860ba459-ffb5-44b5-9822-85bb2487d260">false</Common>
+    <Code_x0020__x0028_old_x0029_ xmlns="860ba459-ffb5-44b5-9822-85bb2487d260" xsi:nil="true"/>
+  </documentManagement>
+</p:properties>
 </file>
 
-<file path=customXml/itemProps2.xml><?xml version="1.0" encoding="utf-8"?>
-<ds:datastoreItem xmlns:ds="http://schemas.openxmlformats.org/officeDocument/2006/customXml" ds:itemID="{29B0D497-D157-4F3E-BD1B-4DEBDA6B0654}">
-  <ds:schemaRefs>
-    <ds:schemaRef ds:uri="http://schemas.openxmlformats.org/package/2006/metadata/core-properties"/>
-    <ds:schemaRef ds:uri="http://schemas.microsoft.com/office/2006/documentManagement/types"/>
-    <ds:schemaRef ds:uri="http://purl.org/dc/elements/1.1/"/>
-    <ds:schemaRef ds:uri="http://purl.org/dc/terms/"/>
-    <ds:schemaRef ds:uri="860ba459-ffb5-44b5-9822-85bb2487d260"/>
-    <ds:schemaRef ds:uri="http://www.w3.org/XML/1998/namespace"/>
-    <ds:schemaRef ds:uri="http://schemas.microsoft.com/office/2006/metadata/properties"/>
-    <ds:schemaRef ds:uri="http://purl.org/dc/dcmitype/"/>
-  </ds:schemaRefs>
-</ds:datastoreItem>
+<file path=customXml/item3.xml><?xml version="1.0" encoding="utf-8"?>
+<?mso-contentType ?>
+<FormTemplates xmlns="http://schemas.microsoft.com/sharepoint/v3/contenttype/forms">
+  <Display>DocumentLibraryForm</Display>
+  <Edit>DocumentLibraryForm</Edit>
+  <New>DocumentLibraryForm</New>
+</FormTemplates>
 </file>
 
-<file path=customXml/itemProps3.xml><?xml version="1.0" encoding="utf-8"?>
+<file path=customXml/itemProps1.xml><?xml version="1.0" encoding="utf-8"?>
 <ds:datastoreItem xmlns:ds="http://schemas.openxmlformats.org/officeDocument/2006/customXml" ds:itemID="{E1700829-D764-4176-99CD-3E6E59F53D1E}">
   <ds:schemaRefs>
     <ds:schemaRef ds:uri="http://schemas.microsoft.com/office/2006/metadata/contentType"/>
@@ -39910,4 +39578,27 @@
     <ds:schemaRef ds:uri="http://schemas.microsoft.com/office/internal/2005/internalDocumentation"/>
   </ds:schemaRefs>
 </ds:datastoreItem>
+</file>
+
+<file path=customXml/itemProps2.xml><?xml version="1.0" encoding="utf-8"?>
+<ds:datastoreItem xmlns:ds="http://schemas.openxmlformats.org/officeDocument/2006/customXml" ds:itemID="{29B0D497-D157-4F3E-BD1B-4DEBDA6B0654}">
+  <ds:schemaRefs>
+    <ds:schemaRef ds:uri="http://schemas.microsoft.com/office/2006/documentManagement/types"/>
+    <ds:schemaRef ds:uri="http://www.w3.org/XML/1998/namespace"/>
+    <ds:schemaRef ds:uri="http://purl.org/dc/dcmitype/"/>
+    <ds:schemaRef ds:uri="http://purl.org/dc/elements/1.1/"/>
+    <ds:schemaRef ds:uri="http://purl.org/dc/terms/"/>
+    <ds:schemaRef ds:uri="http://schemas.openxmlformats.org/package/2006/metadata/core-properties"/>
+    <ds:schemaRef ds:uri="http://schemas.microsoft.com/office/2006/metadata/properties"/>
+    <ds:schemaRef ds:uri="860ba459-ffb5-44b5-9822-85bb2487d260"/>
+  </ds:schemaRefs>
+</ds:datastoreItem>
+</file>
+
+<file path=customXml/itemProps3.xml><?xml version="1.0" encoding="utf-8"?>
+<ds:datastoreItem xmlns:ds="http://schemas.openxmlformats.org/officeDocument/2006/customXml" ds:itemID="{7265E8A9-CA70-4BF7-A7BA-C90C3F4E27E7}">
+  <ds:schemaRefs>
+    <ds:schemaRef ds:uri="http://schemas.microsoft.com/sharepoint/v3/contenttype/forms"/>
+  </ds:schemaRefs>
+</ds:datastoreItem>
 </file>
</xml_diff>

<commit_message>
SWIFT interface slide modified
</commit_message>
<xml_diff>
--- a/SWIFT TLC - Overview.pptx
+++ b/SWIFT TLC - Overview.pptx
@@ -245,7 +245,7 @@
               <a:pPr>
                 <a:defRPr/>
               </a:pPr>
-              <a:t>27.04.2015</a:t>
+              <a:t>29.04.2015</a:t>
             </a:fld>
             <a:endParaRPr lang="de-DE"/>
           </a:p>
@@ -34761,7 +34761,7 @@
           <p:nvPr>
             <p:extLst>
               <p:ext uri="{D42A27DB-BD31-4B8C-83A1-F6EECF244321}">
-                <p14:modId xmlns:p14="http://schemas.microsoft.com/office/powerpoint/2010/main" val="3958209827"/>
+                <p14:modId xmlns:p14="http://schemas.microsoft.com/office/powerpoint/2010/main" val="4161079617"/>
               </p:ext>
             </p:extLst>
           </p:nvPr>
@@ -35515,7 +35515,13 @@
                         <a:rPr lang="en-US" sz="1300" baseline="0" dirty="0" smtClean="0">
                           <a:effectLst/>
                         </a:rPr>
-                        <a:t> SWIFT object</a:t>
+                        <a:t> SWIFT </a:t>
+                      </a:r>
+                      <a:r>
+                        <a:rPr lang="en-US" sz="1300" baseline="0" smtClean="0">
+                          <a:effectLst/>
+                        </a:rPr>
+                        <a:t>object auditor source file</a:t>
                       </a:r>
                       <a:endParaRPr lang="en-US" sz="1300" dirty="0">
                         <a:effectLst/>
@@ -39422,6 +39428,30 @@
 </file>
 
 <file path=customXml/item1.xml><?xml version="1.0" encoding="utf-8"?>
+<?mso-contentType ?>
+<FormTemplates xmlns="http://schemas.microsoft.com/sharepoint/v3/contenttype/forms">
+  <Display>DocumentLibraryForm</Display>
+  <Edit>DocumentLibraryForm</Edit>
+  <New>DocumentLibraryForm</New>
+</FormTemplates>
+</file>
+
+<file path=customXml/item2.xml><?xml version="1.0" encoding="utf-8"?>
+<p:properties xmlns:p="http://schemas.microsoft.com/office/2006/metadata/properties" xmlns:xsi="http://www.w3.org/2001/XMLSchema-instance">
+  <documentManagement>
+    <Rev_x002e_ xmlns="860ba459-ffb5-44b5-9822-85bb2487d260">5</Rev_x002e_>
+    <Creator xmlns="860ba459-ffb5-44b5-9822-85bb2487d260">Deuter Melanie</Creator>
+    <Code xmlns="860ba459-ffb5-44b5-9822-85bb2487d260">0005</Code>
+    <Document xmlns="860ba459-ffb5-44b5-9822-85bb2487d260">Master BDT Power Point</Document>
+    <Status xmlns="860ba459-ffb5-44b5-9822-85bb2487d260">Released</Status>
+    <Dep_x002e_ xmlns="860ba459-ffb5-44b5-9822-85bb2487d260">General Management</Dep_x002e_>
+    <Common xmlns="860ba459-ffb5-44b5-9822-85bb2487d260">false</Common>
+    <Code_x0020__x0028_old_x0029_ xmlns="860ba459-ffb5-44b5-9822-85bb2487d260" xsi:nil="true"/>
+  </documentManagement>
+</p:properties>
+</file>
+
+<file path=customXml/item3.xml><?xml version="1.0" encoding="utf-8"?>
 <ct:contentTypeSchema xmlns:ct="http://schemas.microsoft.com/office/2006/metadata/contentType" xmlns:ma="http://schemas.microsoft.com/office/2006/metadata/properties/metaAttributes" ct:_="" ma:_="" ma:contentTypeName="Document" ma:contentTypeID="0x010100B64ACC541BB8E2409BD6DB8216918708" ma:contentTypeVersion="8" ma:contentTypeDescription="Create a new document." ma:contentTypeScope="" ma:versionID="2bee1d361194ed24bab2ef98d46a27b7">
   <xsd:schema xmlns:xsd="http://www.w3.org/2001/XMLSchema" xmlns:p="http://schemas.microsoft.com/office/2006/metadata/properties" xmlns:ns2="860ba459-ffb5-44b5-9822-85bb2487d260" targetNamespace="http://schemas.microsoft.com/office/2006/metadata/properties" ma:root="true" ma:fieldsID="ce0b00e55cada7d77ce16c67ffad780d" ns2:_="">
     <xsd:import namespace="860ba459-ffb5-44b5-9822-85bb2487d260"/>
@@ -39539,43 +39569,10 @@
 </ct:contentTypeSchema>
 </file>
 
-<file path=customXml/item2.xml><?xml version="1.0" encoding="utf-8"?>
-<p:properties xmlns:p="http://schemas.microsoft.com/office/2006/metadata/properties" xmlns:xsi="http://www.w3.org/2001/XMLSchema-instance">
-  <documentManagement>
-    <Rev_x002e_ xmlns="860ba459-ffb5-44b5-9822-85bb2487d260">5</Rev_x002e_>
-    <Creator xmlns="860ba459-ffb5-44b5-9822-85bb2487d260">Deuter Melanie</Creator>
-    <Code xmlns="860ba459-ffb5-44b5-9822-85bb2487d260">0005</Code>
-    <Document xmlns="860ba459-ffb5-44b5-9822-85bb2487d260">Master BDT Power Point</Document>
-    <Status xmlns="860ba459-ffb5-44b5-9822-85bb2487d260">Released</Status>
-    <Dep_x002e_ xmlns="860ba459-ffb5-44b5-9822-85bb2487d260">General Management</Dep_x002e_>
-    <Common xmlns="860ba459-ffb5-44b5-9822-85bb2487d260">false</Common>
-    <Code_x0020__x0028_old_x0029_ xmlns="860ba459-ffb5-44b5-9822-85bb2487d260" xsi:nil="true"/>
-  </documentManagement>
-</p:properties>
-</file>
-
-<file path=customXml/item3.xml><?xml version="1.0" encoding="utf-8"?>
-<?mso-contentType ?>
-<FormTemplates xmlns="http://schemas.microsoft.com/sharepoint/v3/contenttype/forms">
-  <Display>DocumentLibraryForm</Display>
-  <Edit>DocumentLibraryForm</Edit>
-  <New>DocumentLibraryForm</New>
-</FormTemplates>
-</file>
-
 <file path=customXml/itemProps1.xml><?xml version="1.0" encoding="utf-8"?>
-<ds:datastoreItem xmlns:ds="http://schemas.openxmlformats.org/officeDocument/2006/customXml" ds:itemID="{E1700829-D764-4176-99CD-3E6E59F53D1E}">
+<ds:datastoreItem xmlns:ds="http://schemas.openxmlformats.org/officeDocument/2006/customXml" ds:itemID="{7265E8A9-CA70-4BF7-A7BA-C90C3F4E27E7}">
   <ds:schemaRefs>
-    <ds:schemaRef ds:uri="http://schemas.microsoft.com/office/2006/metadata/contentType"/>
-    <ds:schemaRef ds:uri="http://schemas.microsoft.com/office/2006/metadata/properties/metaAttributes"/>
-    <ds:schemaRef ds:uri="http://www.w3.org/2001/XMLSchema"/>
-    <ds:schemaRef ds:uri="http://schemas.microsoft.com/office/2006/metadata/properties"/>
-    <ds:schemaRef ds:uri="860ba459-ffb5-44b5-9822-85bb2487d260"/>
-    <ds:schemaRef ds:uri="http://schemas.microsoft.com/office/2006/documentManagement/types"/>
-    <ds:schemaRef ds:uri="http://schemas.openxmlformats.org/package/2006/metadata/core-properties"/>
-    <ds:schemaRef ds:uri="http://purl.org/dc/elements/1.1/"/>
-    <ds:schemaRef ds:uri="http://purl.org/dc/terms/"/>
-    <ds:schemaRef ds:uri="http://schemas.microsoft.com/office/internal/2005/internalDocumentation"/>
+    <ds:schemaRef ds:uri="http://schemas.microsoft.com/sharepoint/v3/contenttype/forms"/>
   </ds:schemaRefs>
 </ds:datastoreItem>
 </file>
@@ -39596,9 +39593,18 @@
 </file>
 
 <file path=customXml/itemProps3.xml><?xml version="1.0" encoding="utf-8"?>
-<ds:datastoreItem xmlns:ds="http://schemas.openxmlformats.org/officeDocument/2006/customXml" ds:itemID="{7265E8A9-CA70-4BF7-A7BA-C90C3F4E27E7}">
+<ds:datastoreItem xmlns:ds="http://schemas.openxmlformats.org/officeDocument/2006/customXml" ds:itemID="{E1700829-D764-4176-99CD-3E6E59F53D1E}">
   <ds:schemaRefs>
-    <ds:schemaRef ds:uri="http://schemas.microsoft.com/sharepoint/v3/contenttype/forms"/>
+    <ds:schemaRef ds:uri="http://schemas.microsoft.com/office/2006/metadata/contentType"/>
+    <ds:schemaRef ds:uri="http://schemas.microsoft.com/office/2006/metadata/properties/metaAttributes"/>
+    <ds:schemaRef ds:uri="http://www.w3.org/2001/XMLSchema"/>
+    <ds:schemaRef ds:uri="http://schemas.microsoft.com/office/2006/metadata/properties"/>
+    <ds:schemaRef ds:uri="860ba459-ffb5-44b5-9822-85bb2487d260"/>
+    <ds:schemaRef ds:uri="http://schemas.microsoft.com/office/2006/documentManagement/types"/>
+    <ds:schemaRef ds:uri="http://schemas.openxmlformats.org/package/2006/metadata/core-properties"/>
+    <ds:schemaRef ds:uri="http://purl.org/dc/elements/1.1/"/>
+    <ds:schemaRef ds:uri="http://purl.org/dc/terms/"/>
+    <ds:schemaRef ds:uri="http://schemas.microsoft.com/office/internal/2005/internalDocumentation"/>
   </ds:schemaRefs>
 </ds:datastoreItem>
 </file>
</xml_diff>